<commit_message>
move the jar demo project into the comparator day folder
</commit_message>
<xml_diff>
--- a/ClassMaterials/IntroToUnitTesting/Slides/Part3-ConsoleInput.pptx
+++ b/ClassMaterials/IntroToUnitTesting/Slides/Part3-ConsoleInput.pptx
@@ -5,17 +5,18 @@
     <p:sldMasterId id="2147483927" r:id="rId4"/>
   </p:sldMasterIdLst>
   <p:notesMasterIdLst>
-    <p:notesMasterId r:id="rId10"/>
+    <p:notesMasterId r:id="rId11"/>
   </p:notesMasterIdLst>
   <p:handoutMasterIdLst>
-    <p:handoutMasterId r:id="rId11"/>
+    <p:handoutMasterId r:id="rId12"/>
   </p:handoutMasterIdLst>
   <p:sldIdLst>
     <p:sldId id="256" r:id="rId5"/>
     <p:sldId id="278" r:id="rId6"/>
     <p:sldId id="281" r:id="rId7"/>
-    <p:sldId id="279" r:id="rId8"/>
-    <p:sldId id="280" r:id="rId9"/>
+    <p:sldId id="282" r:id="rId8"/>
+    <p:sldId id="279" r:id="rId9"/>
+    <p:sldId id="280" r:id="rId10"/>
   </p:sldIdLst>
   <p:sldSz cx="9144000" cy="6858000" type="screen4x3"/>
   <p:notesSz cx="7010400" cy="9296400"/>
@@ -280,7 +281,7 @@
               <a:pPr>
                 <a:defRPr/>
               </a:pPr>
-              <a:t>1/5/2023</a:t>
+              <a:t>6/5/2025</a:t>
             </a:fld>
             <a:endParaRPr lang="en-US"/>
           </a:p>
@@ -627,7 +628,7 @@
               <a:pPr>
                 <a:defRPr/>
               </a:pPr>
-              <a:t>1/5/2023</a:t>
+              <a:t>6/5/2025</a:t>
             </a:fld>
             <a:endParaRPr lang="en-US"/>
           </a:p>
@@ -1261,7 +1262,7 @@
               <a:pPr>
                 <a:defRPr/>
               </a:pPr>
-              <a:t>4</a:t>
+              <a:t>5</a:t>
             </a:fld>
             <a:endParaRPr lang="en-US"/>
           </a:p>
@@ -1359,7 +1360,7 @@
               <a:pPr>
                 <a:defRPr/>
               </a:pPr>
-              <a:t>5</a:t>
+              <a:t>6</a:t>
             </a:fld>
             <a:endParaRPr lang="en-US"/>
           </a:p>
@@ -1563,7 +1564,7 @@
               <a:pPr>
                 <a:defRPr/>
               </a:pPr>
-              <a:t>Thursday, January 5, 2023</a:t>
+              <a:t>Thursday, June 5, 2025</a:t>
             </a:fld>
             <a:endParaRPr lang="en-US" dirty="0"/>
           </a:p>
@@ -1746,7 +1747,7 @@
               <a:pPr>
                 <a:defRPr/>
               </a:pPr>
-              <a:t>Thursday, January 5, 2023</a:t>
+              <a:t>Thursday, June 5, 2025</a:t>
             </a:fld>
             <a:endParaRPr lang="en-US" dirty="0"/>
           </a:p>
@@ -1939,7 +1940,7 @@
               <a:pPr>
                 <a:defRPr/>
               </a:pPr>
-              <a:t>Thursday, January 5, 2023</a:t>
+              <a:t>Thursday, June 5, 2025</a:t>
             </a:fld>
             <a:endParaRPr lang="en-US" dirty="0"/>
           </a:p>
@@ -2122,7 +2123,7 @@
               <a:pPr>
                 <a:defRPr/>
               </a:pPr>
-              <a:t>Thursday, January 5, 2023</a:t>
+              <a:t>Thursday, June 5, 2025</a:t>
             </a:fld>
             <a:endParaRPr lang="en-US" dirty="0"/>
           </a:p>
@@ -2382,7 +2383,7 @@
               <a:pPr>
                 <a:defRPr/>
               </a:pPr>
-              <a:t>Thursday, January 5, 2023</a:t>
+              <a:t>Thursday, June 5, 2025</a:t>
             </a:fld>
             <a:endParaRPr lang="en-US"/>
           </a:p>
@@ -2682,7 +2683,7 @@
               <a:pPr>
                 <a:defRPr/>
               </a:pPr>
-              <a:t>Thursday, January 5, 2023</a:t>
+              <a:t>Thursday, June 5, 2025</a:t>
             </a:fld>
             <a:endParaRPr lang="en-US"/>
           </a:p>
@@ -3116,7 +3117,7 @@
               <a:pPr>
                 <a:defRPr/>
               </a:pPr>
-              <a:t>Thursday, January 5, 2023</a:t>
+              <a:t>Thursday, June 5, 2025</a:t>
             </a:fld>
             <a:endParaRPr lang="en-US"/>
           </a:p>
@@ -3248,7 +3249,7 @@
               <a:pPr>
                 <a:defRPr/>
               </a:pPr>
-              <a:t>Thursday, January 5, 2023</a:t>
+              <a:t>Thursday, June 5, 2025</a:t>
             </a:fld>
             <a:endParaRPr lang="en-US"/>
           </a:p>
@@ -3358,7 +3359,7 @@
               <a:pPr>
                 <a:defRPr/>
               </a:pPr>
-              <a:t>Thursday, January 5, 2023</a:t>
+              <a:t>Thursday, June 5, 2025</a:t>
             </a:fld>
             <a:endParaRPr lang="en-US" dirty="0"/>
           </a:p>
@@ -3648,7 +3649,7 @@
               <a:pPr>
                 <a:defRPr/>
               </a:pPr>
-              <a:t>Thursday, January 5, 2023</a:t>
+              <a:t>Thursday, June 5, 2025</a:t>
             </a:fld>
             <a:endParaRPr lang="en-US"/>
           </a:p>
@@ -3915,7 +3916,7 @@
               <a:pPr>
                 <a:defRPr/>
               </a:pPr>
-              <a:t>Thursday, January 5, 2023</a:t>
+              <a:t>Thursday, June 5, 2025</a:t>
             </a:fld>
             <a:endParaRPr lang="en-US"/>
           </a:p>
@@ -4141,7 +4142,7 @@
               <a:pPr>
                 <a:defRPr/>
               </a:pPr>
-              <a:t>Thursday, January 5, 2023</a:t>
+              <a:t>Thursday, June 5, 2025</a:t>
             </a:fld>
             <a:endParaRPr lang="en-US" dirty="0"/>
           </a:p>
@@ -5348,8 +5349,8 @@
           </a:p>
         </p:txBody>
       </p:sp>
-      <mc:AlternateContent xmlns:mc="http://schemas.openxmlformats.org/markup-compatibility/2006">
-        <mc:Choice xmlns:p14="http://schemas.microsoft.com/office/powerpoint/2010/main" Requires="p14">
+      <mc:AlternateContent xmlns:mc="http://schemas.openxmlformats.org/markup-compatibility/2006" xmlns:p14="http://schemas.microsoft.com/office/powerpoint/2010/main">
+        <mc:Choice Requires="p14">
           <p:contentPart p14:bwMode="auto" r:id="rId2">
             <p14:nvContentPartPr>
               <p14:cNvPr id="9" name="Ink 8">
@@ -5368,7 +5369,7 @@
             </p14:xfrm>
           </p:contentPart>
         </mc:Choice>
-        <mc:Fallback>
+        <mc:Fallback xmlns="">
           <p:pic>
             <p:nvPicPr>
               <p:cNvPr id="9" name="Ink 8">
@@ -5419,8 +5420,8 @@
             <a:chExt cx="5286600" cy="1456200"/>
           </a:xfrm>
         </p:grpSpPr>
-        <mc:AlternateContent xmlns:mc="http://schemas.openxmlformats.org/markup-compatibility/2006">
-          <mc:Choice xmlns:p14="http://schemas.microsoft.com/office/powerpoint/2010/main" Requires="p14">
+        <mc:AlternateContent xmlns:mc="http://schemas.openxmlformats.org/markup-compatibility/2006" xmlns:p14="http://schemas.microsoft.com/office/powerpoint/2010/main">
+          <mc:Choice Requires="p14">
             <p:contentPart p14:bwMode="auto" r:id="rId4">
               <p14:nvContentPartPr>
                 <p14:cNvPr id="10" name="Ink 9">
@@ -5439,7 +5440,7 @@
               </p14:xfrm>
             </p:contentPart>
           </mc:Choice>
-          <mc:Fallback>
+          <mc:Fallback xmlns="">
             <p:pic>
               <p:nvPicPr>
                 <p:cNvPr id="10" name="Ink 9">
@@ -5470,8 +5471,8 @@
             </p:pic>
           </mc:Fallback>
         </mc:AlternateContent>
-        <mc:AlternateContent xmlns:mc="http://schemas.openxmlformats.org/markup-compatibility/2006">
-          <mc:Choice xmlns:p14="http://schemas.microsoft.com/office/powerpoint/2010/main" Requires="p14">
+        <mc:AlternateContent xmlns:mc="http://schemas.openxmlformats.org/markup-compatibility/2006" xmlns:p14="http://schemas.microsoft.com/office/powerpoint/2010/main">
+          <mc:Choice Requires="p14">
             <p:contentPart p14:bwMode="auto" r:id="rId6">
               <p14:nvContentPartPr>
                 <p14:cNvPr id="11" name="Ink 10">
@@ -5490,7 +5491,7 @@
               </p14:xfrm>
             </p:contentPart>
           </mc:Choice>
-          <mc:Fallback>
+          <mc:Fallback xmlns="">
             <p:pic>
               <p:nvPicPr>
                 <p:cNvPr id="11" name="Ink 10">
@@ -5521,8 +5522,8 @@
             </p:pic>
           </mc:Fallback>
         </mc:AlternateContent>
-        <mc:AlternateContent xmlns:mc="http://schemas.openxmlformats.org/markup-compatibility/2006">
-          <mc:Choice xmlns:p14="http://schemas.microsoft.com/office/powerpoint/2010/main" Requires="p14">
+        <mc:AlternateContent xmlns:mc="http://schemas.openxmlformats.org/markup-compatibility/2006" xmlns:p14="http://schemas.microsoft.com/office/powerpoint/2010/main">
+          <mc:Choice Requires="p14">
             <p:contentPart p14:bwMode="auto" r:id="rId8">
               <p14:nvContentPartPr>
                 <p14:cNvPr id="12" name="Ink 11">
@@ -5541,7 +5542,7 @@
               </p14:xfrm>
             </p:contentPart>
           </mc:Choice>
-          <mc:Fallback>
+          <mc:Fallback xmlns="">
             <p:pic>
               <p:nvPicPr>
                 <p:cNvPr id="12" name="Ink 11">
@@ -5719,6 +5720,149 @@
 </file>
 
 <file path=ppt/slides/slide4.xml><?xml version="1.0" encoding="utf-8"?>
+<p:sld xmlns:a="http://schemas.openxmlformats.org/drawingml/2006/main" xmlns:r="http://schemas.openxmlformats.org/officeDocument/2006/relationships" xmlns:p="http://schemas.openxmlformats.org/presentationml/2006/main">
+  <p:cSld>
+    <p:spTree>
+      <p:nvGrpSpPr>
+        <p:cNvPr id="1" name=""/>
+        <p:cNvGrpSpPr/>
+        <p:nvPr/>
+      </p:nvGrpSpPr>
+      <p:grpSpPr>
+        <a:xfrm>
+          <a:off x="0" y="0"/>
+          <a:ext cx="0" cy="0"/>
+          <a:chOff x="0" y="0"/>
+          <a:chExt cx="0" cy="0"/>
+        </a:xfrm>
+      </p:grpSpPr>
+      <p:sp>
+        <p:nvSpPr>
+          <p:cNvPr id="2" name="Title 1">
+            <a:extLst>
+              <a:ext uri="{FF2B5EF4-FFF2-40B4-BE49-F238E27FC236}">
+                <a16:creationId xmlns:a16="http://schemas.microsoft.com/office/drawing/2014/main" id="{06B372DC-9A65-DE8A-497D-E541E2720B4C}"/>
+              </a:ext>
+            </a:extLst>
+          </p:cNvPr>
+          <p:cNvSpPr>
+            <a:spLocks noGrp="1"/>
+          </p:cNvSpPr>
+          <p:nvPr>
+            <p:ph type="title"/>
+          </p:nvPr>
+        </p:nvSpPr>
+        <p:spPr/>
+        <p:txBody>
+          <a:bodyPr>
+            <a:normAutofit fontScale="90000"/>
+          </a:bodyPr>
+          <a:lstStyle/>
+          <a:p>
+            <a:r>
+              <a:rPr lang="en-US" sz="4800" dirty="0">
+                <a:latin typeface="Consolas" panose="020B0609020204030204" pitchFamily="49" charset="0"/>
+              </a:rPr>
+              <a:t>Backslash (\ ) </a:t>
+            </a:r>
+            <a:br>
+              <a:rPr lang="en-US" sz="4800" dirty="0">
+                <a:latin typeface="Consolas" panose="020B0609020204030204" pitchFamily="49" charset="0"/>
+              </a:rPr>
+            </a:br>
+            <a:r>
+              <a:rPr lang="en-US" sz="4800" dirty="0">
+                <a:latin typeface="Consolas" panose="020B0609020204030204" pitchFamily="49" charset="0"/>
+              </a:rPr>
+              <a:t>Escape Characters</a:t>
+            </a:r>
+          </a:p>
+        </p:txBody>
+      </p:sp>
+      <p:sp>
+        <p:nvSpPr>
+          <p:cNvPr id="3" name="Content Placeholder 2">
+            <a:extLst>
+              <a:ext uri="{FF2B5EF4-FFF2-40B4-BE49-F238E27FC236}">
+                <a16:creationId xmlns:a16="http://schemas.microsoft.com/office/drawing/2014/main" id="{F4D9EBF9-BA40-7ABD-4D2B-150FDA995C9B}"/>
+              </a:ext>
+            </a:extLst>
+          </p:cNvPr>
+          <p:cNvSpPr>
+            <a:spLocks noGrp="1"/>
+          </p:cNvSpPr>
+          <p:nvPr>
+            <p:ph idx="1"/>
+          </p:nvPr>
+        </p:nvSpPr>
+        <p:spPr>
+          <a:xfrm>
+            <a:off x="304800" y="1600200"/>
+            <a:ext cx="8610600" cy="4525963"/>
+          </a:xfrm>
+        </p:spPr>
+        <p:txBody>
+          <a:bodyPr>
+            <a:normAutofit fontScale="92500" lnSpcReduction="10000"/>
+          </a:bodyPr>
+          <a:lstStyle/>
+          <a:p>
+            <a:r>
+              <a:rPr lang="en-US" dirty="0"/>
+              <a:t>The backslash symbol  “\”  is an escape character</a:t>
+            </a:r>
+          </a:p>
+          <a:p>
+            <a:r>
+              <a:rPr lang="en-US" dirty="0"/>
+              <a:t>“\n” means new line</a:t>
+            </a:r>
+          </a:p>
+          <a:p>
+            <a:pPr lvl="1"/>
+            <a:r>
+              <a:rPr lang="en-US" dirty="0"/>
+              <a:t>When you press “enter” when typing, that is recorded as a special new line character</a:t>
+            </a:r>
+          </a:p>
+          <a:p>
+            <a:r>
+              <a:rPr lang="en-US" dirty="0"/>
+              <a:t>If you want to print a backslash in a Java string, you have to escape it as well i.e. “\\”</a:t>
+            </a:r>
+          </a:p>
+          <a:p>
+            <a:r>
+              <a:rPr lang="en-US" dirty="0"/>
+              <a:t>Similarly, to see a double quote you need to escape it: “Here is an escape double quote: \” in a string”</a:t>
+            </a:r>
+          </a:p>
+          <a:p>
+            <a:r>
+              <a:rPr lang="en-US" dirty="0" err="1"/>
+              <a:t>nextLine</a:t>
+            </a:r>
+            <a:r>
+              <a:rPr lang="en-US" dirty="0"/>
+              <a:t>() reads until finding a “\n” character</a:t>
+            </a:r>
+          </a:p>
+        </p:txBody>
+      </p:sp>
+    </p:spTree>
+    <p:extLst>
+      <p:ext uri="{BB962C8B-B14F-4D97-AF65-F5344CB8AC3E}">
+        <p14:creationId xmlns:p14="http://schemas.microsoft.com/office/powerpoint/2010/main" val="4255773744"/>
+      </p:ext>
+    </p:extLst>
+  </p:cSld>
+  <p:clrMapOvr>
+    <a:masterClrMapping/>
+  </p:clrMapOvr>
+</p:sld>
+</file>
+
+<file path=ppt/slides/slide5.xml><?xml version="1.0" encoding="utf-8"?>
 <p:sld xmlns:a="http://schemas.openxmlformats.org/drawingml/2006/main" xmlns:r="http://schemas.openxmlformats.org/officeDocument/2006/relationships" xmlns:p="http://schemas.openxmlformats.org/presentationml/2006/main">
   <p:cSld>
     <p:spTree>
@@ -5915,7 +6059,7 @@
 </p:sld>
 </file>
 
-<file path=ppt/slides/slide5.xml><?xml version="1.0" encoding="utf-8"?>
+<file path=ppt/slides/slide6.xml><?xml version="1.0" encoding="utf-8"?>
 <p:sld xmlns:a="http://schemas.openxmlformats.org/drawingml/2006/main" xmlns:r="http://schemas.openxmlformats.org/officeDocument/2006/relationships" xmlns:p="http://schemas.openxmlformats.org/presentationml/2006/main">
   <p:cSld>
     <p:spTree>
@@ -6970,6 +7114,17 @@
 </file>
 
 <file path=customXml/item2.xml><?xml version="1.0" encoding="utf-8"?>
+<p:properties xmlns:p="http://schemas.microsoft.com/office/2006/metadata/properties" xmlns:xsi="http://www.w3.org/2001/XMLSchema-instance" xmlns:pc="http://schemas.microsoft.com/office/infopath/2007/PartnerControls">
+  <documentManagement>
+    <TaxCatchAll xmlns="820f9cb1-409d-4c4b-8197-1d4f7dd48124" xsi:nil="true"/>
+    <lcf76f155ced4ddcb4097134ff3c332f xmlns="08600313-7276-4ca7-b5d3-7d86193ee0ac">
+      <Terms xmlns="http://schemas.microsoft.com/office/infopath/2007/PartnerControls"/>
+    </lcf76f155ced4ddcb4097134ff3c332f>
+  </documentManagement>
+</p:properties>
+</file>
+
+<file path=customXml/item3.xml><?xml version="1.0" encoding="utf-8"?>
 <ct:contentTypeSchema xmlns:ct="http://schemas.microsoft.com/office/2006/metadata/contentType" xmlns:ma="http://schemas.microsoft.com/office/2006/metadata/properties/metaAttributes" ct:_="" ma:_="" ma:contentTypeName="Document" ma:contentTypeID="0x0101004285D81DBE5F5A448E892B34D6B8CF20" ma:contentTypeVersion="8" ma:contentTypeDescription="Create a new document." ma:contentTypeScope="" ma:versionID="ecce54155d2ea7caa9aed06c8b6b9867">
   <xsd:schema xmlns:xsd="http://www.w3.org/2001/XMLSchema" xmlns:xs="http://www.w3.org/2001/XMLSchema" xmlns:p="http://schemas.microsoft.com/office/2006/metadata/properties" xmlns:ns2="08600313-7276-4ca7-b5d3-7d86193ee0ac" xmlns:ns3="820f9cb1-409d-4c4b-8197-1d4f7dd48124" targetNamespace="http://schemas.microsoft.com/office/2006/metadata/properties" ma:root="true" ma:fieldsID="bfd7385540b70b2fe84ac888cc214377" ns2:_="" ns3:_="">
     <xsd:import namespace="08600313-7276-4ca7-b5d3-7d86193ee0ac"/>
@@ -7146,17 +7301,6 @@
 </ct:contentTypeSchema>
 </file>
 
-<file path=customXml/item3.xml><?xml version="1.0" encoding="utf-8"?>
-<p:properties xmlns:p="http://schemas.microsoft.com/office/2006/metadata/properties" xmlns:xsi="http://www.w3.org/2001/XMLSchema-instance" xmlns:pc="http://schemas.microsoft.com/office/infopath/2007/PartnerControls">
-  <documentManagement>
-    <TaxCatchAll xmlns="820f9cb1-409d-4c4b-8197-1d4f7dd48124" xsi:nil="true"/>
-    <lcf76f155ced4ddcb4097134ff3c332f xmlns="08600313-7276-4ca7-b5d3-7d86193ee0ac">
-      <Terms xmlns="http://schemas.microsoft.com/office/infopath/2007/PartnerControls"/>
-    </lcf76f155ced4ddcb4097134ff3c332f>
-  </documentManagement>
-</p:properties>
-</file>
-
 <file path=customXml/itemProps1.xml><?xml version="1.0" encoding="utf-8"?>
 <ds:datastoreItem xmlns:ds="http://schemas.openxmlformats.org/officeDocument/2006/customXml" ds:itemID="{497D5DD0-6988-40A3-ACE3-E3DC120C3DD3}">
   <ds:schemaRefs>
@@ -7166,6 +7310,17 @@
 </file>
 
 <file path=customXml/itemProps2.xml><?xml version="1.0" encoding="utf-8"?>
+<ds:datastoreItem xmlns:ds="http://schemas.openxmlformats.org/officeDocument/2006/customXml" ds:itemID="{ACFC3617-A446-41D4-B89F-413174CC8F31}">
+  <ds:schemaRefs>
+    <ds:schemaRef ds:uri="http://schemas.microsoft.com/office/2006/metadata/properties"/>
+    <ds:schemaRef ds:uri="http://schemas.microsoft.com/office/infopath/2007/PartnerControls"/>
+    <ds:schemaRef ds:uri="820f9cb1-409d-4c4b-8197-1d4f7dd48124"/>
+    <ds:schemaRef ds:uri="08600313-7276-4ca7-b5d3-7d86193ee0ac"/>
+  </ds:schemaRefs>
+</ds:datastoreItem>
+</file>
+
+<file path=customXml/itemProps3.xml><?xml version="1.0" encoding="utf-8"?>
 <ds:datastoreItem xmlns:ds="http://schemas.openxmlformats.org/officeDocument/2006/customXml" ds:itemID="{07E16780-08FD-41FA-9AD4-B6FC03A1F28F}">
   <ds:schemaRefs>
     <ds:schemaRef ds:uri="http://schemas.microsoft.com/office/2006/metadata/contentType"/>
@@ -7182,15 +7337,4 @@
     <ds:schemaRef ds:uri="http://schemas.microsoft.com/internal/obd"/>
   </ds:schemaRefs>
 </ds:datastoreItem>
-</file>
-
-<file path=customXml/itemProps3.xml><?xml version="1.0" encoding="utf-8"?>
-<ds:datastoreItem xmlns:ds="http://schemas.openxmlformats.org/officeDocument/2006/customXml" ds:itemID="{ACFC3617-A446-41D4-B89F-413174CC8F31}">
-  <ds:schemaRefs>
-    <ds:schemaRef ds:uri="http://schemas.microsoft.com/office/2006/metadata/properties"/>
-    <ds:schemaRef ds:uri="http://schemas.microsoft.com/office/infopath/2007/PartnerControls"/>
-    <ds:schemaRef ds:uri="820f9cb1-409d-4c4b-8197-1d4f7dd48124"/>
-    <ds:schemaRef ds:uri="08600313-7276-4ca7-b5d3-7d86193ee0ac"/>
-  </ds:schemaRefs>
-</ds:datastoreItem>
 </file>
</xml_diff>